<commit_message>
Added server related scripts and plots
</commit_message>
<xml_diff>
--- a/plots/Gemma_Plot.pptx
+++ b/plots/Gemma_Plot.pptx
@@ -3887,8 +3887,8 @@
           </p:nvSpPr>
           <p:spPr>
             <a:xfrm>
-              <a:off x="4327977" y="3231698"/>
-              <a:ext cx="702115" cy="369332"/>
+              <a:off x="5644593" y="3240511"/>
+              <a:ext cx="527403" cy="369332"/>
             </a:xfrm>
             <a:prstGeom prst="rect">
               <a:avLst/>
@@ -3945,8 +3945,8 @@
           </p:nvSpPr>
           <p:spPr>
             <a:xfrm>
-              <a:off x="5633702" y="3231698"/>
-              <a:ext cx="765591" cy="369332"/>
+              <a:off x="4225057" y="3240511"/>
+              <a:ext cx="708404" cy="369332"/>
             </a:xfrm>
             <a:prstGeom prst="rect">
               <a:avLst/>
@@ -4198,7 +4198,10 @@
               <a:ext cx="457203" cy="1563439"/>
             </a:xfrm>
             <a:prstGeom prst="rightBrace">
-              <a:avLst/>
+              <a:avLst>
+                <a:gd name="adj1" fmla="val 8333"/>
+                <a:gd name="adj2" fmla="val 50001"/>
+              </a:avLst>
             </a:prstGeom>
             <a:ln>
               <a:solidFill>

</xml_diff>